<commit_message>
some stuff I forgot
</commit_message>
<xml_diff>
--- a/Presentations/Advanced Topics.pptx
+++ b/Presentations/Advanced Topics.pptx
@@ -5,16 +5,18 @@
     <p:sldMasterId id="2147483672" r:id="rId1"/>
   </p:sldMasterIdLst>
   <p:notesMasterIdLst>
-    <p:notesMasterId r:id="rId9"/>
+    <p:notesMasterId r:id="rId11"/>
   </p:notesMasterIdLst>
   <p:sldIdLst>
     <p:sldId id="256" r:id="rId2"/>
     <p:sldId id="257" r:id="rId3"/>
     <p:sldId id="258" r:id="rId4"/>
     <p:sldId id="259" r:id="rId5"/>
-    <p:sldId id="260" r:id="rId6"/>
-    <p:sldId id="261" r:id="rId7"/>
-    <p:sldId id="262" r:id="rId8"/>
+    <p:sldId id="263" r:id="rId6"/>
+    <p:sldId id="264" r:id="rId7"/>
+    <p:sldId id="260" r:id="rId8"/>
+    <p:sldId id="261" r:id="rId9"/>
+    <p:sldId id="262" r:id="rId10"/>
   </p:sldIdLst>
   <p:sldSz cx="12192000" cy="6858000"/>
   <p:notesSz cx="6858000" cy="9144000"/>
@@ -130,6 +132,8 @@
         <p14:section name="Faceted Search Queries" id="{BC758524-D9F5-44A5-B560-BE864C56D34C}">
           <p14:sldIdLst>
             <p14:sldId id="259"/>
+            <p14:sldId id="263"/>
+            <p14:sldId id="264"/>
           </p14:sldIdLst>
         </p14:section>
         <p14:section name="Streaming" id="{446126C2-C391-4B38-BF64-9B172A9D6FE1}">
@@ -959,7 +963,7 @@
           <a:p>
             <a:fld id="{C6AD357A-9B07-49E4-9C63-A5479884F697}" type="slidenum">
               <a:rPr lang="he-IL" smtClean="0"/>
-              <a:t>6</a:t>
+              <a:t>8</a:t>
             </a:fld>
             <a:endParaRPr lang="he-IL"/>
           </a:p>
@@ -1102,7 +1106,7 @@
           <a:p>
             <a:fld id="{C6AD357A-9B07-49E4-9C63-A5479884F697}" type="slidenum">
               <a:rPr lang="he-IL" smtClean="0"/>
-              <a:t>7</a:t>
+              <a:t>9</a:t>
             </a:fld>
             <a:endParaRPr lang="he-IL"/>
           </a:p>
@@ -7591,13 +7595,23 @@
           <a:p>
             <a:r>
               <a:rPr lang="en-US" dirty="0" smtClean="0"/>
-              <a:t>Aggregate </a:t>
-            </a:r>
-            <a:r>
-              <a:rPr lang="en-US" smtClean="0"/>
-              <a:t>by ranges</a:t>
-            </a:r>
-            <a:endParaRPr lang="en-US"/>
+              <a:t>Aggregate by ranges</a:t>
+            </a:r>
+          </a:p>
+          <a:p>
+            <a:r>
+              <a:rPr lang="en-US" dirty="0" smtClean="0"/>
+              <a:t>Reporting in </a:t>
+            </a:r>
+            <a:r>
+              <a:rPr lang="en-US" dirty="0" err="1" smtClean="0"/>
+              <a:t>RavenDB</a:t>
+            </a:r>
+            <a:r>
+              <a:rPr lang="en-US" dirty="0" smtClean="0"/>
+              <a:t>?</a:t>
+            </a:r>
+            <a:endParaRPr lang="en-US" dirty="0"/>
           </a:p>
         </p:txBody>
       </p:sp>
@@ -7615,6 +7629,1020 @@
 </file>
 
 <file path=ppt/slides/slide5.xml><?xml version="1.0" encoding="utf-8"?>
+<p:sld xmlns:a="http://schemas.openxmlformats.org/drawingml/2006/main" xmlns:r="http://schemas.openxmlformats.org/officeDocument/2006/relationships" xmlns:p="http://schemas.openxmlformats.org/presentationml/2006/main">
+  <p:cSld>
+    <p:spTree>
+      <p:nvGrpSpPr>
+        <p:cNvPr id="1" name=""/>
+        <p:cNvGrpSpPr/>
+        <p:nvPr/>
+      </p:nvGrpSpPr>
+      <p:grpSpPr>
+        <a:xfrm>
+          <a:off x="0" y="0"/>
+          <a:ext cx="0" cy="0"/>
+          <a:chOff x="0" y="0"/>
+          <a:chExt cx="0" cy="0"/>
+        </a:xfrm>
+      </p:grpSpPr>
+      <p:sp>
+        <p:nvSpPr>
+          <p:cNvPr id="2" name="Title 1"/>
+          <p:cNvSpPr>
+            <a:spLocks noGrp="1"/>
+          </p:cNvSpPr>
+          <p:nvPr>
+            <p:ph type="title"/>
+          </p:nvPr>
+        </p:nvSpPr>
+        <p:spPr/>
+        <p:txBody>
+          <a:bodyPr/>
+          <a:lstStyle/>
+          <a:p>
+            <a:r>
+              <a:rPr lang="en-US" dirty="0" smtClean="0"/>
+              <a:t>Facets</a:t>
+            </a:r>
+            <a:endParaRPr lang="en-US" dirty="0"/>
+          </a:p>
+        </p:txBody>
+      </p:sp>
+      <p:pic>
+        <p:nvPicPr>
+          <p:cNvPr id="4" name="Picture 3"/>
+          <p:cNvPicPr>
+            <a:picLocks noChangeAspect="1"/>
+          </p:cNvPicPr>
+          <p:nvPr/>
+        </p:nvPicPr>
+        <p:blipFill>
+          <a:blip r:embed="rId2"/>
+          <a:stretch>
+            <a:fillRect/>
+          </a:stretch>
+        </p:blipFill>
+        <p:spPr>
+          <a:xfrm>
+            <a:off x="1902369" y="2214694"/>
+            <a:ext cx="8923399" cy="4047356"/>
+          </a:xfrm>
+          <a:prstGeom prst="rect">
+            <a:avLst/>
+          </a:prstGeom>
+        </p:spPr>
+      </p:pic>
+      <p:sp>
+        <p:nvSpPr>
+          <p:cNvPr id="6" name="Freeform 5"/>
+          <p:cNvSpPr/>
+          <p:nvPr/>
+        </p:nvSpPr>
+        <p:spPr>
+          <a:xfrm>
+            <a:off x="1705970" y="2456597"/>
+            <a:ext cx="2661314" cy="4203510"/>
+          </a:xfrm>
+          <a:custGeom>
+            <a:avLst/>
+            <a:gdLst>
+              <a:gd name="connsiteX0" fmla="*/ 109182 w 2661314"/>
+              <a:gd name="connsiteY0" fmla="*/ 600502 h 4203510"/>
+              <a:gd name="connsiteX1" fmla="*/ 163773 w 2661314"/>
+              <a:gd name="connsiteY1" fmla="*/ 518615 h 4203510"/>
+              <a:gd name="connsiteX2" fmla="*/ 177421 w 2661314"/>
+              <a:gd name="connsiteY2" fmla="*/ 464024 h 4203510"/>
+              <a:gd name="connsiteX3" fmla="*/ 218364 w 2661314"/>
+              <a:gd name="connsiteY3" fmla="*/ 423081 h 4203510"/>
+              <a:gd name="connsiteX4" fmla="*/ 245660 w 2661314"/>
+              <a:gd name="connsiteY4" fmla="*/ 368490 h 4203510"/>
+              <a:gd name="connsiteX5" fmla="*/ 286603 w 2661314"/>
+              <a:gd name="connsiteY5" fmla="*/ 313899 h 4203510"/>
+              <a:gd name="connsiteX6" fmla="*/ 313899 w 2661314"/>
+              <a:gd name="connsiteY6" fmla="*/ 272955 h 4203510"/>
+              <a:gd name="connsiteX7" fmla="*/ 354842 w 2661314"/>
+              <a:gd name="connsiteY7" fmla="*/ 204716 h 4203510"/>
+              <a:gd name="connsiteX8" fmla="*/ 477672 w 2661314"/>
+              <a:gd name="connsiteY8" fmla="*/ 136478 h 4203510"/>
+              <a:gd name="connsiteX9" fmla="*/ 559558 w 2661314"/>
+              <a:gd name="connsiteY9" fmla="*/ 109182 h 4203510"/>
+              <a:gd name="connsiteX10" fmla="*/ 709684 w 2661314"/>
+              <a:gd name="connsiteY10" fmla="*/ 54591 h 4203510"/>
+              <a:gd name="connsiteX11" fmla="*/ 777923 w 2661314"/>
+              <a:gd name="connsiteY11" fmla="*/ 40943 h 4203510"/>
+              <a:gd name="connsiteX12" fmla="*/ 859809 w 2661314"/>
+              <a:gd name="connsiteY12" fmla="*/ 27296 h 4203510"/>
+              <a:gd name="connsiteX13" fmla="*/ 1023582 w 2661314"/>
+              <a:gd name="connsiteY13" fmla="*/ 0 h 4203510"/>
+              <a:gd name="connsiteX14" fmla="*/ 1173708 w 2661314"/>
+              <a:gd name="connsiteY14" fmla="*/ 13648 h 4203510"/>
+              <a:gd name="connsiteX15" fmla="*/ 1241946 w 2661314"/>
+              <a:gd name="connsiteY15" fmla="*/ 40943 h 4203510"/>
+              <a:gd name="connsiteX16" fmla="*/ 1323833 w 2661314"/>
+              <a:gd name="connsiteY16" fmla="*/ 54591 h 4203510"/>
+              <a:gd name="connsiteX17" fmla="*/ 1528549 w 2661314"/>
+              <a:gd name="connsiteY17" fmla="*/ 81887 h 4203510"/>
+              <a:gd name="connsiteX18" fmla="*/ 1692323 w 2661314"/>
+              <a:gd name="connsiteY18" fmla="*/ 136478 h 4203510"/>
+              <a:gd name="connsiteX19" fmla="*/ 1924334 w 2661314"/>
+              <a:gd name="connsiteY19" fmla="*/ 232012 h 4203510"/>
+              <a:gd name="connsiteX20" fmla="*/ 2142699 w 2661314"/>
+              <a:gd name="connsiteY20" fmla="*/ 313899 h 4203510"/>
+              <a:gd name="connsiteX21" fmla="*/ 2292824 w 2661314"/>
+              <a:gd name="connsiteY21" fmla="*/ 409433 h 4203510"/>
+              <a:gd name="connsiteX22" fmla="*/ 2361063 w 2661314"/>
+              <a:gd name="connsiteY22" fmla="*/ 464024 h 4203510"/>
+              <a:gd name="connsiteX23" fmla="*/ 2442949 w 2661314"/>
+              <a:gd name="connsiteY23" fmla="*/ 518615 h 4203510"/>
+              <a:gd name="connsiteX24" fmla="*/ 2524836 w 2661314"/>
+              <a:gd name="connsiteY24" fmla="*/ 614149 h 4203510"/>
+              <a:gd name="connsiteX25" fmla="*/ 2565779 w 2661314"/>
+              <a:gd name="connsiteY25" fmla="*/ 791570 h 4203510"/>
+              <a:gd name="connsiteX26" fmla="*/ 2579427 w 2661314"/>
+              <a:gd name="connsiteY26" fmla="*/ 1023582 h 4203510"/>
+              <a:gd name="connsiteX27" fmla="*/ 2606723 w 2661314"/>
+              <a:gd name="connsiteY27" fmla="*/ 1173707 h 4203510"/>
+              <a:gd name="connsiteX28" fmla="*/ 2634018 w 2661314"/>
+              <a:gd name="connsiteY28" fmla="*/ 1337481 h 4203510"/>
+              <a:gd name="connsiteX29" fmla="*/ 2647666 w 2661314"/>
+              <a:gd name="connsiteY29" fmla="*/ 1651379 h 4203510"/>
+              <a:gd name="connsiteX30" fmla="*/ 2661314 w 2661314"/>
+              <a:gd name="connsiteY30" fmla="*/ 1774209 h 4203510"/>
+              <a:gd name="connsiteX31" fmla="*/ 2647666 w 2661314"/>
+              <a:gd name="connsiteY31" fmla="*/ 2197290 h 4203510"/>
+              <a:gd name="connsiteX32" fmla="*/ 2620370 w 2661314"/>
+              <a:gd name="connsiteY32" fmla="*/ 2320119 h 4203510"/>
+              <a:gd name="connsiteX33" fmla="*/ 2606723 w 2661314"/>
+              <a:gd name="connsiteY33" fmla="*/ 2415654 h 4203510"/>
+              <a:gd name="connsiteX34" fmla="*/ 2552131 w 2661314"/>
+              <a:gd name="connsiteY34" fmla="*/ 2729552 h 4203510"/>
+              <a:gd name="connsiteX35" fmla="*/ 2538484 w 2661314"/>
+              <a:gd name="connsiteY35" fmla="*/ 3016155 h 4203510"/>
+              <a:gd name="connsiteX36" fmla="*/ 2511188 w 2661314"/>
+              <a:gd name="connsiteY36" fmla="*/ 3084394 h 4203510"/>
+              <a:gd name="connsiteX37" fmla="*/ 2456597 w 2661314"/>
+              <a:gd name="connsiteY37" fmla="*/ 3370997 h 4203510"/>
+              <a:gd name="connsiteX38" fmla="*/ 2402006 w 2661314"/>
+              <a:gd name="connsiteY38" fmla="*/ 3534770 h 4203510"/>
+              <a:gd name="connsiteX39" fmla="*/ 2333767 w 2661314"/>
+              <a:gd name="connsiteY39" fmla="*/ 3643952 h 4203510"/>
+              <a:gd name="connsiteX40" fmla="*/ 2183642 w 2661314"/>
+              <a:gd name="connsiteY40" fmla="*/ 3739487 h 4203510"/>
+              <a:gd name="connsiteX41" fmla="*/ 2129051 w 2661314"/>
+              <a:gd name="connsiteY41" fmla="*/ 3766782 h 4203510"/>
+              <a:gd name="connsiteX42" fmla="*/ 2019869 w 2661314"/>
+              <a:gd name="connsiteY42" fmla="*/ 3835021 h 4203510"/>
+              <a:gd name="connsiteX43" fmla="*/ 1924334 w 2661314"/>
+              <a:gd name="connsiteY43" fmla="*/ 3916907 h 4203510"/>
+              <a:gd name="connsiteX44" fmla="*/ 1869743 w 2661314"/>
+              <a:gd name="connsiteY44" fmla="*/ 3930555 h 4203510"/>
+              <a:gd name="connsiteX45" fmla="*/ 1828800 w 2661314"/>
+              <a:gd name="connsiteY45" fmla="*/ 3944203 h 4203510"/>
+              <a:gd name="connsiteX46" fmla="*/ 1760561 w 2661314"/>
+              <a:gd name="connsiteY46" fmla="*/ 3985146 h 4203510"/>
+              <a:gd name="connsiteX47" fmla="*/ 1719618 w 2661314"/>
+              <a:gd name="connsiteY47" fmla="*/ 4012442 h 4203510"/>
+              <a:gd name="connsiteX48" fmla="*/ 1651379 w 2661314"/>
+              <a:gd name="connsiteY48" fmla="*/ 4039737 h 4203510"/>
+              <a:gd name="connsiteX49" fmla="*/ 1501254 w 2661314"/>
+              <a:gd name="connsiteY49" fmla="*/ 4121624 h 4203510"/>
+              <a:gd name="connsiteX50" fmla="*/ 1392072 w 2661314"/>
+              <a:gd name="connsiteY50" fmla="*/ 4176215 h 4203510"/>
+              <a:gd name="connsiteX51" fmla="*/ 1282890 w 2661314"/>
+              <a:gd name="connsiteY51" fmla="*/ 4203510 h 4203510"/>
+              <a:gd name="connsiteX52" fmla="*/ 941696 w 2661314"/>
+              <a:gd name="connsiteY52" fmla="*/ 4189863 h 4203510"/>
+              <a:gd name="connsiteX53" fmla="*/ 900752 w 2661314"/>
+              <a:gd name="connsiteY53" fmla="*/ 4176215 h 4203510"/>
+              <a:gd name="connsiteX54" fmla="*/ 832514 w 2661314"/>
+              <a:gd name="connsiteY54" fmla="*/ 4148919 h 4203510"/>
+              <a:gd name="connsiteX55" fmla="*/ 791570 w 2661314"/>
+              <a:gd name="connsiteY55" fmla="*/ 4135272 h 4203510"/>
+              <a:gd name="connsiteX56" fmla="*/ 627797 w 2661314"/>
+              <a:gd name="connsiteY56" fmla="*/ 4039737 h 4203510"/>
+              <a:gd name="connsiteX57" fmla="*/ 573206 w 2661314"/>
+              <a:gd name="connsiteY57" fmla="*/ 3998794 h 4203510"/>
+              <a:gd name="connsiteX58" fmla="*/ 436729 w 2661314"/>
+              <a:gd name="connsiteY58" fmla="*/ 3930555 h 4203510"/>
+              <a:gd name="connsiteX59" fmla="*/ 382137 w 2661314"/>
+              <a:gd name="connsiteY59" fmla="*/ 3875964 h 4203510"/>
+              <a:gd name="connsiteX60" fmla="*/ 259308 w 2661314"/>
+              <a:gd name="connsiteY60" fmla="*/ 3807725 h 4203510"/>
+              <a:gd name="connsiteX61" fmla="*/ 204717 w 2661314"/>
+              <a:gd name="connsiteY61" fmla="*/ 3766782 h 4203510"/>
+              <a:gd name="connsiteX62" fmla="*/ 95534 w 2661314"/>
+              <a:gd name="connsiteY62" fmla="*/ 3698543 h 4203510"/>
+              <a:gd name="connsiteX63" fmla="*/ 81887 w 2661314"/>
+              <a:gd name="connsiteY63" fmla="*/ 3643952 h 4203510"/>
+              <a:gd name="connsiteX64" fmla="*/ 40943 w 2661314"/>
+              <a:gd name="connsiteY64" fmla="*/ 3575713 h 4203510"/>
+              <a:gd name="connsiteX65" fmla="*/ 27296 w 2661314"/>
+              <a:gd name="connsiteY65" fmla="*/ 3466531 h 4203510"/>
+              <a:gd name="connsiteX66" fmla="*/ 54591 w 2661314"/>
+              <a:gd name="connsiteY66" fmla="*/ 2811439 h 4203510"/>
+              <a:gd name="connsiteX67" fmla="*/ 68239 w 2661314"/>
+              <a:gd name="connsiteY67" fmla="*/ 2729552 h 4203510"/>
+              <a:gd name="connsiteX68" fmla="*/ 95534 w 2661314"/>
+              <a:gd name="connsiteY68" fmla="*/ 2647666 h 4203510"/>
+              <a:gd name="connsiteX69" fmla="*/ 95534 w 2661314"/>
+              <a:gd name="connsiteY69" fmla="*/ 1746913 h 4203510"/>
+              <a:gd name="connsiteX70" fmla="*/ 81887 w 2661314"/>
+              <a:gd name="connsiteY70" fmla="*/ 1514902 h 4203510"/>
+              <a:gd name="connsiteX71" fmla="*/ 54591 w 2661314"/>
+              <a:gd name="connsiteY71" fmla="*/ 1446663 h 4203510"/>
+              <a:gd name="connsiteX72" fmla="*/ 40943 w 2661314"/>
+              <a:gd name="connsiteY72" fmla="*/ 1405719 h 4203510"/>
+              <a:gd name="connsiteX73" fmla="*/ 27296 w 2661314"/>
+              <a:gd name="connsiteY73" fmla="*/ 1214651 h 4203510"/>
+              <a:gd name="connsiteX74" fmla="*/ 0 w 2661314"/>
+              <a:gd name="connsiteY74" fmla="*/ 1132764 h 4203510"/>
+              <a:gd name="connsiteX75" fmla="*/ 13648 w 2661314"/>
+              <a:gd name="connsiteY75" fmla="*/ 1050878 h 4203510"/>
+              <a:gd name="connsiteX76" fmla="*/ 54591 w 2661314"/>
+              <a:gd name="connsiteY76" fmla="*/ 941696 h 4203510"/>
+              <a:gd name="connsiteX77" fmla="*/ 68239 w 2661314"/>
+              <a:gd name="connsiteY77" fmla="*/ 832513 h 4203510"/>
+              <a:gd name="connsiteX78" fmla="*/ 122830 w 2661314"/>
+              <a:gd name="connsiteY78" fmla="*/ 614149 h 4203510"/>
+              <a:gd name="connsiteX79" fmla="*/ 109182 w 2661314"/>
+              <a:gd name="connsiteY79" fmla="*/ 600502 h 4203510"/>
+            </a:gdLst>
+            <a:ahLst/>
+            <a:cxnLst>
+              <a:cxn ang="0">
+                <a:pos x="connsiteX0" y="connsiteY0"/>
+              </a:cxn>
+              <a:cxn ang="0">
+                <a:pos x="connsiteX1" y="connsiteY1"/>
+              </a:cxn>
+              <a:cxn ang="0">
+                <a:pos x="connsiteX2" y="connsiteY2"/>
+              </a:cxn>
+              <a:cxn ang="0">
+                <a:pos x="connsiteX3" y="connsiteY3"/>
+              </a:cxn>
+              <a:cxn ang="0">
+                <a:pos x="connsiteX4" y="connsiteY4"/>
+              </a:cxn>
+              <a:cxn ang="0">
+                <a:pos x="connsiteX5" y="connsiteY5"/>
+              </a:cxn>
+              <a:cxn ang="0">
+                <a:pos x="connsiteX6" y="connsiteY6"/>
+              </a:cxn>
+              <a:cxn ang="0">
+                <a:pos x="connsiteX7" y="connsiteY7"/>
+              </a:cxn>
+              <a:cxn ang="0">
+                <a:pos x="connsiteX8" y="connsiteY8"/>
+              </a:cxn>
+              <a:cxn ang="0">
+                <a:pos x="connsiteX9" y="connsiteY9"/>
+              </a:cxn>
+              <a:cxn ang="0">
+                <a:pos x="connsiteX10" y="connsiteY10"/>
+              </a:cxn>
+              <a:cxn ang="0">
+                <a:pos x="connsiteX11" y="connsiteY11"/>
+              </a:cxn>
+              <a:cxn ang="0">
+                <a:pos x="connsiteX12" y="connsiteY12"/>
+              </a:cxn>
+              <a:cxn ang="0">
+                <a:pos x="connsiteX13" y="connsiteY13"/>
+              </a:cxn>
+              <a:cxn ang="0">
+                <a:pos x="connsiteX14" y="connsiteY14"/>
+              </a:cxn>
+              <a:cxn ang="0">
+                <a:pos x="connsiteX15" y="connsiteY15"/>
+              </a:cxn>
+              <a:cxn ang="0">
+                <a:pos x="connsiteX16" y="connsiteY16"/>
+              </a:cxn>
+              <a:cxn ang="0">
+                <a:pos x="connsiteX17" y="connsiteY17"/>
+              </a:cxn>
+              <a:cxn ang="0">
+                <a:pos x="connsiteX18" y="connsiteY18"/>
+              </a:cxn>
+              <a:cxn ang="0">
+                <a:pos x="connsiteX19" y="connsiteY19"/>
+              </a:cxn>
+              <a:cxn ang="0">
+                <a:pos x="connsiteX20" y="connsiteY20"/>
+              </a:cxn>
+              <a:cxn ang="0">
+                <a:pos x="connsiteX21" y="connsiteY21"/>
+              </a:cxn>
+              <a:cxn ang="0">
+                <a:pos x="connsiteX22" y="connsiteY22"/>
+              </a:cxn>
+              <a:cxn ang="0">
+                <a:pos x="connsiteX23" y="connsiteY23"/>
+              </a:cxn>
+              <a:cxn ang="0">
+                <a:pos x="connsiteX24" y="connsiteY24"/>
+              </a:cxn>
+              <a:cxn ang="0">
+                <a:pos x="connsiteX25" y="connsiteY25"/>
+              </a:cxn>
+              <a:cxn ang="0">
+                <a:pos x="connsiteX26" y="connsiteY26"/>
+              </a:cxn>
+              <a:cxn ang="0">
+                <a:pos x="connsiteX27" y="connsiteY27"/>
+              </a:cxn>
+              <a:cxn ang="0">
+                <a:pos x="connsiteX28" y="connsiteY28"/>
+              </a:cxn>
+              <a:cxn ang="0">
+                <a:pos x="connsiteX29" y="connsiteY29"/>
+              </a:cxn>
+              <a:cxn ang="0">
+                <a:pos x="connsiteX30" y="connsiteY30"/>
+              </a:cxn>
+              <a:cxn ang="0">
+                <a:pos x="connsiteX31" y="connsiteY31"/>
+              </a:cxn>
+              <a:cxn ang="0">
+                <a:pos x="connsiteX32" y="connsiteY32"/>
+              </a:cxn>
+              <a:cxn ang="0">
+                <a:pos x="connsiteX33" y="connsiteY33"/>
+              </a:cxn>
+              <a:cxn ang="0">
+                <a:pos x="connsiteX34" y="connsiteY34"/>
+              </a:cxn>
+              <a:cxn ang="0">
+                <a:pos x="connsiteX35" y="connsiteY35"/>
+              </a:cxn>
+              <a:cxn ang="0">
+                <a:pos x="connsiteX36" y="connsiteY36"/>
+              </a:cxn>
+              <a:cxn ang="0">
+                <a:pos x="connsiteX37" y="connsiteY37"/>
+              </a:cxn>
+              <a:cxn ang="0">
+                <a:pos x="connsiteX38" y="connsiteY38"/>
+              </a:cxn>
+              <a:cxn ang="0">
+                <a:pos x="connsiteX39" y="connsiteY39"/>
+              </a:cxn>
+              <a:cxn ang="0">
+                <a:pos x="connsiteX40" y="connsiteY40"/>
+              </a:cxn>
+              <a:cxn ang="0">
+                <a:pos x="connsiteX41" y="connsiteY41"/>
+              </a:cxn>
+              <a:cxn ang="0">
+                <a:pos x="connsiteX42" y="connsiteY42"/>
+              </a:cxn>
+              <a:cxn ang="0">
+                <a:pos x="connsiteX43" y="connsiteY43"/>
+              </a:cxn>
+              <a:cxn ang="0">
+                <a:pos x="connsiteX44" y="connsiteY44"/>
+              </a:cxn>
+              <a:cxn ang="0">
+                <a:pos x="connsiteX45" y="connsiteY45"/>
+              </a:cxn>
+              <a:cxn ang="0">
+                <a:pos x="connsiteX46" y="connsiteY46"/>
+              </a:cxn>
+              <a:cxn ang="0">
+                <a:pos x="connsiteX47" y="connsiteY47"/>
+              </a:cxn>
+              <a:cxn ang="0">
+                <a:pos x="connsiteX48" y="connsiteY48"/>
+              </a:cxn>
+              <a:cxn ang="0">
+                <a:pos x="connsiteX49" y="connsiteY49"/>
+              </a:cxn>
+              <a:cxn ang="0">
+                <a:pos x="connsiteX50" y="connsiteY50"/>
+              </a:cxn>
+              <a:cxn ang="0">
+                <a:pos x="connsiteX51" y="connsiteY51"/>
+              </a:cxn>
+              <a:cxn ang="0">
+                <a:pos x="connsiteX52" y="connsiteY52"/>
+              </a:cxn>
+              <a:cxn ang="0">
+                <a:pos x="connsiteX53" y="connsiteY53"/>
+              </a:cxn>
+              <a:cxn ang="0">
+                <a:pos x="connsiteX54" y="connsiteY54"/>
+              </a:cxn>
+              <a:cxn ang="0">
+                <a:pos x="connsiteX55" y="connsiteY55"/>
+              </a:cxn>
+              <a:cxn ang="0">
+                <a:pos x="connsiteX56" y="connsiteY56"/>
+              </a:cxn>
+              <a:cxn ang="0">
+                <a:pos x="connsiteX57" y="connsiteY57"/>
+              </a:cxn>
+              <a:cxn ang="0">
+                <a:pos x="connsiteX58" y="connsiteY58"/>
+              </a:cxn>
+              <a:cxn ang="0">
+                <a:pos x="connsiteX59" y="connsiteY59"/>
+              </a:cxn>
+              <a:cxn ang="0">
+                <a:pos x="connsiteX60" y="connsiteY60"/>
+              </a:cxn>
+              <a:cxn ang="0">
+                <a:pos x="connsiteX61" y="connsiteY61"/>
+              </a:cxn>
+              <a:cxn ang="0">
+                <a:pos x="connsiteX62" y="connsiteY62"/>
+              </a:cxn>
+              <a:cxn ang="0">
+                <a:pos x="connsiteX63" y="connsiteY63"/>
+              </a:cxn>
+              <a:cxn ang="0">
+                <a:pos x="connsiteX64" y="connsiteY64"/>
+              </a:cxn>
+              <a:cxn ang="0">
+                <a:pos x="connsiteX65" y="connsiteY65"/>
+              </a:cxn>
+              <a:cxn ang="0">
+                <a:pos x="connsiteX66" y="connsiteY66"/>
+              </a:cxn>
+              <a:cxn ang="0">
+                <a:pos x="connsiteX67" y="connsiteY67"/>
+              </a:cxn>
+              <a:cxn ang="0">
+                <a:pos x="connsiteX68" y="connsiteY68"/>
+              </a:cxn>
+              <a:cxn ang="0">
+                <a:pos x="connsiteX69" y="connsiteY69"/>
+              </a:cxn>
+              <a:cxn ang="0">
+                <a:pos x="connsiteX70" y="connsiteY70"/>
+              </a:cxn>
+              <a:cxn ang="0">
+                <a:pos x="connsiteX71" y="connsiteY71"/>
+              </a:cxn>
+              <a:cxn ang="0">
+                <a:pos x="connsiteX72" y="connsiteY72"/>
+              </a:cxn>
+              <a:cxn ang="0">
+                <a:pos x="connsiteX73" y="connsiteY73"/>
+              </a:cxn>
+              <a:cxn ang="0">
+                <a:pos x="connsiteX74" y="connsiteY74"/>
+              </a:cxn>
+              <a:cxn ang="0">
+                <a:pos x="connsiteX75" y="connsiteY75"/>
+              </a:cxn>
+              <a:cxn ang="0">
+                <a:pos x="connsiteX76" y="connsiteY76"/>
+              </a:cxn>
+              <a:cxn ang="0">
+                <a:pos x="connsiteX77" y="connsiteY77"/>
+              </a:cxn>
+              <a:cxn ang="0">
+                <a:pos x="connsiteX78" y="connsiteY78"/>
+              </a:cxn>
+              <a:cxn ang="0">
+                <a:pos x="connsiteX79" y="connsiteY79"/>
+              </a:cxn>
+            </a:cxnLst>
+            <a:rect l="l" t="t" r="r" b="b"/>
+            <a:pathLst>
+              <a:path w="2661314" h="4203510">
+                <a:moveTo>
+                  <a:pt x="109182" y="600502"/>
+                </a:moveTo>
+                <a:cubicBezTo>
+                  <a:pt x="127379" y="573206"/>
+                  <a:pt x="149102" y="547957"/>
+                  <a:pt x="163773" y="518615"/>
+                </a:cubicBezTo>
+                <a:cubicBezTo>
+                  <a:pt x="172161" y="501838"/>
+                  <a:pt x="168115" y="480310"/>
+                  <a:pt x="177421" y="464024"/>
+                </a:cubicBezTo>
+                <a:cubicBezTo>
+                  <a:pt x="186997" y="447266"/>
+                  <a:pt x="207146" y="438787"/>
+                  <a:pt x="218364" y="423081"/>
+                </a:cubicBezTo>
+                <a:cubicBezTo>
+                  <a:pt x="230189" y="406526"/>
+                  <a:pt x="234877" y="385742"/>
+                  <a:pt x="245660" y="368490"/>
+                </a:cubicBezTo>
+                <a:cubicBezTo>
+                  <a:pt x="257715" y="349201"/>
+                  <a:pt x="273382" y="332408"/>
+                  <a:pt x="286603" y="313899"/>
+                </a:cubicBezTo>
+                <a:cubicBezTo>
+                  <a:pt x="296137" y="300551"/>
+                  <a:pt x="305206" y="286865"/>
+                  <a:pt x="313899" y="272955"/>
+                </a:cubicBezTo>
+                <a:cubicBezTo>
+                  <a:pt x="327958" y="250461"/>
+                  <a:pt x="337374" y="224679"/>
+                  <a:pt x="354842" y="204716"/>
+                </a:cubicBezTo>
+                <a:cubicBezTo>
+                  <a:pt x="387756" y="167099"/>
+                  <a:pt x="432769" y="152806"/>
+                  <a:pt x="477672" y="136478"/>
+                </a:cubicBezTo>
+                <a:cubicBezTo>
+                  <a:pt x="504712" y="126645"/>
+                  <a:pt x="532263" y="118281"/>
+                  <a:pt x="559558" y="109182"/>
+                </a:cubicBezTo>
+                <a:cubicBezTo>
+                  <a:pt x="643291" y="46383"/>
+                  <a:pt x="586813" y="75070"/>
+                  <a:pt x="709684" y="54591"/>
+                </a:cubicBezTo>
+                <a:cubicBezTo>
+                  <a:pt x="732565" y="50777"/>
+                  <a:pt x="755100" y="45093"/>
+                  <a:pt x="777923" y="40943"/>
+                </a:cubicBezTo>
+                <a:cubicBezTo>
+                  <a:pt x="805148" y="35993"/>
+                  <a:pt x="832459" y="31504"/>
+                  <a:pt x="859809" y="27296"/>
+                </a:cubicBezTo>
+                <a:cubicBezTo>
+                  <a:pt x="1006504" y="4728"/>
+                  <a:pt x="903466" y="24024"/>
+                  <a:pt x="1023582" y="0"/>
+                </a:cubicBezTo>
+                <a:cubicBezTo>
+                  <a:pt x="1073624" y="4549"/>
+                  <a:pt x="1124320" y="4388"/>
+                  <a:pt x="1173708" y="13648"/>
+                </a:cubicBezTo>
+                <a:cubicBezTo>
+                  <a:pt x="1197787" y="18163"/>
+                  <a:pt x="1218311" y="34497"/>
+                  <a:pt x="1241946" y="40943"/>
+                </a:cubicBezTo>
+                <a:cubicBezTo>
+                  <a:pt x="1268643" y="48224"/>
+                  <a:pt x="1296404" y="50934"/>
+                  <a:pt x="1323833" y="54591"/>
+                </a:cubicBezTo>
+                <a:cubicBezTo>
+                  <a:pt x="1356991" y="59012"/>
+                  <a:pt x="1484737" y="69717"/>
+                  <a:pt x="1528549" y="81887"/>
+                </a:cubicBezTo>
+                <a:cubicBezTo>
+                  <a:pt x="1583994" y="97288"/>
+                  <a:pt x="1638443" y="116273"/>
+                  <a:pt x="1692323" y="136478"/>
+                </a:cubicBezTo>
+                <a:cubicBezTo>
+                  <a:pt x="1802758" y="177891"/>
+                  <a:pt x="1812900" y="179227"/>
+                  <a:pt x="1924334" y="232012"/>
+                </a:cubicBezTo>
+                <a:cubicBezTo>
+                  <a:pt x="2099382" y="314930"/>
+                  <a:pt x="2003123" y="290636"/>
+                  <a:pt x="2142699" y="313899"/>
+                </a:cubicBezTo>
+                <a:cubicBezTo>
+                  <a:pt x="2320620" y="456237"/>
+                  <a:pt x="2094939" y="283507"/>
+                  <a:pt x="2292824" y="409433"/>
+                </a:cubicBezTo>
+                <a:cubicBezTo>
+                  <a:pt x="2317399" y="425072"/>
+                  <a:pt x="2337505" y="446891"/>
+                  <a:pt x="2361063" y="464024"/>
+                </a:cubicBezTo>
+                <a:cubicBezTo>
+                  <a:pt x="2387594" y="483319"/>
+                  <a:pt x="2417054" y="498475"/>
+                  <a:pt x="2442949" y="518615"/>
+                </a:cubicBezTo>
+                <a:cubicBezTo>
+                  <a:pt x="2477169" y="545230"/>
+                  <a:pt x="2499193" y="579957"/>
+                  <a:pt x="2524836" y="614149"/>
+                </a:cubicBezTo>
+                <a:cubicBezTo>
+                  <a:pt x="2546929" y="680428"/>
+                  <a:pt x="2555740" y="701218"/>
+                  <a:pt x="2565779" y="791570"/>
+                </a:cubicBezTo>
+                <a:cubicBezTo>
+                  <a:pt x="2574334" y="868567"/>
+                  <a:pt x="2572716" y="946402"/>
+                  <a:pt x="2579427" y="1023582"/>
+                </a:cubicBezTo>
+                <a:cubicBezTo>
+                  <a:pt x="2583565" y="1071169"/>
+                  <a:pt x="2598816" y="1126266"/>
+                  <a:pt x="2606723" y="1173707"/>
+                </a:cubicBezTo>
+                <a:cubicBezTo>
+                  <a:pt x="2640580" y="1376853"/>
+                  <a:pt x="2601853" y="1176658"/>
+                  <a:pt x="2634018" y="1337481"/>
+                </a:cubicBezTo>
+                <a:cubicBezTo>
+                  <a:pt x="2638567" y="1442114"/>
+                  <a:pt x="2641133" y="1546851"/>
+                  <a:pt x="2647666" y="1651379"/>
+                </a:cubicBezTo>
+                <a:cubicBezTo>
+                  <a:pt x="2650236" y="1692494"/>
+                  <a:pt x="2661314" y="1733014"/>
+                  <a:pt x="2661314" y="1774209"/>
+                </a:cubicBezTo>
+                <a:cubicBezTo>
+                  <a:pt x="2661314" y="1915309"/>
+                  <a:pt x="2655493" y="2056407"/>
+                  <a:pt x="2647666" y="2197290"/>
+                </a:cubicBezTo>
+                <a:cubicBezTo>
+                  <a:pt x="2645499" y="2236301"/>
+                  <a:pt x="2627386" y="2281530"/>
+                  <a:pt x="2620370" y="2320119"/>
+                </a:cubicBezTo>
+                <a:cubicBezTo>
+                  <a:pt x="2614616" y="2351768"/>
+                  <a:pt x="2612477" y="2384005"/>
+                  <a:pt x="2606723" y="2415654"/>
+                </a:cubicBezTo>
+                <a:cubicBezTo>
+                  <a:pt x="2548956" y="2733374"/>
+                  <a:pt x="2579486" y="2510714"/>
+                  <a:pt x="2552131" y="2729552"/>
+                </a:cubicBezTo>
+                <a:cubicBezTo>
+                  <a:pt x="2547582" y="2825086"/>
+                  <a:pt x="2549447" y="2921143"/>
+                  <a:pt x="2538484" y="3016155"/>
+                </a:cubicBezTo>
+                <a:cubicBezTo>
+                  <a:pt x="2535676" y="3040492"/>
+                  <a:pt x="2515009" y="3060195"/>
+                  <a:pt x="2511188" y="3084394"/>
+                </a:cubicBezTo>
+                <a:cubicBezTo>
+                  <a:pt x="2464181" y="3382098"/>
+                  <a:pt x="2539453" y="3177665"/>
+                  <a:pt x="2456597" y="3370997"/>
+                </a:cubicBezTo>
+                <a:cubicBezTo>
+                  <a:pt x="2437410" y="3505306"/>
+                  <a:pt x="2460973" y="3428627"/>
+                  <a:pt x="2402006" y="3534770"/>
+                </a:cubicBezTo>
+                <a:cubicBezTo>
+                  <a:pt x="2382815" y="3569314"/>
+                  <a:pt x="2366484" y="3618246"/>
+                  <a:pt x="2333767" y="3643952"/>
+                </a:cubicBezTo>
+                <a:cubicBezTo>
+                  <a:pt x="2287127" y="3680598"/>
+                  <a:pt x="2236695" y="3712961"/>
+                  <a:pt x="2183642" y="3739487"/>
+                </a:cubicBezTo>
+                <a:cubicBezTo>
+                  <a:pt x="2165445" y="3748585"/>
+                  <a:pt x="2145979" y="3755497"/>
+                  <a:pt x="2129051" y="3766782"/>
+                </a:cubicBezTo>
+                <a:cubicBezTo>
+                  <a:pt x="2017788" y="3840957"/>
+                  <a:pt x="2104147" y="3806928"/>
+                  <a:pt x="2019869" y="3835021"/>
+                </a:cubicBezTo>
+                <a:cubicBezTo>
+                  <a:pt x="1992552" y="3862338"/>
+                  <a:pt x="1959353" y="3899398"/>
+                  <a:pt x="1924334" y="3916907"/>
+                </a:cubicBezTo>
+                <a:cubicBezTo>
+                  <a:pt x="1907557" y="3925295"/>
+                  <a:pt x="1887778" y="3925402"/>
+                  <a:pt x="1869743" y="3930555"/>
+                </a:cubicBezTo>
+                <a:cubicBezTo>
+                  <a:pt x="1855911" y="3934507"/>
+                  <a:pt x="1841667" y="3937769"/>
+                  <a:pt x="1828800" y="3944203"/>
+                </a:cubicBezTo>
+                <a:cubicBezTo>
+                  <a:pt x="1805074" y="3956066"/>
+                  <a:pt x="1783055" y="3971087"/>
+                  <a:pt x="1760561" y="3985146"/>
+                </a:cubicBezTo>
+                <a:cubicBezTo>
+                  <a:pt x="1746652" y="3993839"/>
+                  <a:pt x="1734289" y="4005107"/>
+                  <a:pt x="1719618" y="4012442"/>
+                </a:cubicBezTo>
+                <a:cubicBezTo>
+                  <a:pt x="1697706" y="4023398"/>
+                  <a:pt x="1672886" y="4028006"/>
+                  <a:pt x="1651379" y="4039737"/>
+                </a:cubicBezTo>
+                <a:cubicBezTo>
+                  <a:pt x="1463875" y="4142012"/>
+                  <a:pt x="1663604" y="4056683"/>
+                  <a:pt x="1501254" y="4121624"/>
+                </a:cubicBezTo>
+                <a:cubicBezTo>
+                  <a:pt x="1441008" y="4181870"/>
+                  <a:pt x="1482723" y="4155296"/>
+                  <a:pt x="1392072" y="4176215"/>
+                </a:cubicBezTo>
+                <a:cubicBezTo>
+                  <a:pt x="1355519" y="4184650"/>
+                  <a:pt x="1282890" y="4203510"/>
+                  <a:pt x="1282890" y="4203510"/>
+                </a:cubicBezTo>
+                <a:cubicBezTo>
+                  <a:pt x="1169159" y="4198961"/>
+                  <a:pt x="1055229" y="4197972"/>
+                  <a:pt x="941696" y="4189863"/>
+                </a:cubicBezTo>
+                <a:cubicBezTo>
+                  <a:pt x="927346" y="4188838"/>
+                  <a:pt x="914222" y="4181266"/>
+                  <a:pt x="900752" y="4176215"/>
+                </a:cubicBezTo>
+                <a:cubicBezTo>
+                  <a:pt x="877814" y="4167613"/>
+                  <a:pt x="855452" y="4157521"/>
+                  <a:pt x="832514" y="4148919"/>
+                </a:cubicBezTo>
+                <a:cubicBezTo>
+                  <a:pt x="819044" y="4143868"/>
+                  <a:pt x="804793" y="4140939"/>
+                  <a:pt x="791570" y="4135272"/>
+                </a:cubicBezTo>
+                <a:cubicBezTo>
+                  <a:pt x="742565" y="4114270"/>
+                  <a:pt x="661471" y="4064992"/>
+                  <a:pt x="627797" y="4039737"/>
+                </a:cubicBezTo>
+                <a:cubicBezTo>
+                  <a:pt x="609600" y="4026089"/>
+                  <a:pt x="592955" y="4010079"/>
+                  <a:pt x="573206" y="3998794"/>
+                </a:cubicBezTo>
+                <a:cubicBezTo>
+                  <a:pt x="529045" y="3973559"/>
+                  <a:pt x="472694" y="3966520"/>
+                  <a:pt x="436729" y="3930555"/>
+                </a:cubicBezTo>
+                <a:cubicBezTo>
+                  <a:pt x="418532" y="3912358"/>
+                  <a:pt x="402451" y="3891764"/>
+                  <a:pt x="382137" y="3875964"/>
+                </a:cubicBezTo>
+                <a:cubicBezTo>
+                  <a:pt x="312614" y="3821891"/>
+                  <a:pt x="325230" y="3848926"/>
+                  <a:pt x="259308" y="3807725"/>
+                </a:cubicBezTo>
+                <a:cubicBezTo>
+                  <a:pt x="240019" y="3795670"/>
+                  <a:pt x="224006" y="3778837"/>
+                  <a:pt x="204717" y="3766782"/>
+                </a:cubicBezTo>
+                <a:cubicBezTo>
+                  <a:pt x="54847" y="3673114"/>
+                  <a:pt x="250182" y="3814529"/>
+                  <a:pt x="95534" y="3698543"/>
+                </a:cubicBezTo>
+                <a:cubicBezTo>
+                  <a:pt x="90985" y="3680346"/>
+                  <a:pt x="89505" y="3661092"/>
+                  <a:pt x="81887" y="3643952"/>
+                </a:cubicBezTo>
+                <a:cubicBezTo>
+                  <a:pt x="71114" y="3619712"/>
+                  <a:pt x="48744" y="3601067"/>
+                  <a:pt x="40943" y="3575713"/>
+                </a:cubicBezTo>
+                <a:cubicBezTo>
+                  <a:pt x="30157" y="3540658"/>
+                  <a:pt x="31845" y="3502925"/>
+                  <a:pt x="27296" y="3466531"/>
+                </a:cubicBezTo>
+                <a:cubicBezTo>
+                  <a:pt x="36394" y="3248167"/>
+                  <a:pt x="42468" y="3029656"/>
+                  <a:pt x="54591" y="2811439"/>
+                </a:cubicBezTo>
+                <a:cubicBezTo>
+                  <a:pt x="56126" y="2783809"/>
+                  <a:pt x="61528" y="2756398"/>
+                  <a:pt x="68239" y="2729552"/>
+                </a:cubicBezTo>
+                <a:cubicBezTo>
+                  <a:pt x="75217" y="2701639"/>
+                  <a:pt x="86436" y="2674961"/>
+                  <a:pt x="95534" y="2647666"/>
+                </a:cubicBezTo>
+                <a:cubicBezTo>
+                  <a:pt x="146353" y="2291940"/>
+                  <a:pt x="116350" y="2537935"/>
+                  <a:pt x="95534" y="1746913"/>
+                </a:cubicBezTo>
+                <a:cubicBezTo>
+                  <a:pt x="93496" y="1669469"/>
+                  <a:pt x="92354" y="1591662"/>
+                  <a:pt x="81887" y="1514902"/>
+                </a:cubicBezTo>
+                <a:cubicBezTo>
+                  <a:pt x="78577" y="1490628"/>
+                  <a:pt x="63193" y="1469602"/>
+                  <a:pt x="54591" y="1446663"/>
+                </a:cubicBezTo>
+                <a:cubicBezTo>
+                  <a:pt x="49540" y="1433193"/>
+                  <a:pt x="45492" y="1419367"/>
+                  <a:pt x="40943" y="1405719"/>
+                </a:cubicBezTo>
+                <a:cubicBezTo>
+                  <a:pt x="36394" y="1342030"/>
+                  <a:pt x="36768" y="1277796"/>
+                  <a:pt x="27296" y="1214651"/>
+                </a:cubicBezTo>
+                <a:cubicBezTo>
+                  <a:pt x="23028" y="1186197"/>
+                  <a:pt x="0" y="1132764"/>
+                  <a:pt x="0" y="1132764"/>
+                </a:cubicBezTo>
+                <a:cubicBezTo>
+                  <a:pt x="4549" y="1105469"/>
+                  <a:pt x="7645" y="1077891"/>
+                  <a:pt x="13648" y="1050878"/>
+                </a:cubicBezTo>
+                <a:cubicBezTo>
+                  <a:pt x="18997" y="1026809"/>
+                  <a:pt x="49278" y="954979"/>
+                  <a:pt x="54591" y="941696"/>
+                </a:cubicBezTo>
+                <a:cubicBezTo>
+                  <a:pt x="59140" y="905302"/>
+                  <a:pt x="64918" y="869040"/>
+                  <a:pt x="68239" y="832513"/>
+                </a:cubicBezTo>
+                <a:cubicBezTo>
+                  <a:pt x="87357" y="622216"/>
+                  <a:pt x="27655" y="677601"/>
+                  <a:pt x="122830" y="614149"/>
+                </a:cubicBezTo>
+                <a:lnTo>
+                  <a:pt x="109182" y="600502"/>
+                </a:lnTo>
+                <a:close/>
+              </a:path>
+            </a:pathLst>
+          </a:custGeom>
+          <a:noFill/>
+          <a:ln w="76200">
+            <a:solidFill>
+              <a:srgbClr val="C00000"/>
+            </a:solidFill>
+          </a:ln>
+        </p:spPr>
+        <p:style>
+          <a:lnRef idx="2">
+            <a:schemeClr val="accent1">
+              <a:shade val="50000"/>
+            </a:schemeClr>
+          </a:lnRef>
+          <a:fillRef idx="1">
+            <a:schemeClr val="accent1"/>
+          </a:fillRef>
+          <a:effectRef idx="0">
+            <a:schemeClr val="accent1"/>
+          </a:effectRef>
+          <a:fontRef idx="minor">
+            <a:schemeClr val="lt1"/>
+          </a:fontRef>
+        </p:style>
+        <p:txBody>
+          <a:bodyPr rtlCol="0" anchor="ctr"/>
+          <a:lstStyle/>
+          <a:p>
+            <a:pPr algn="ctr"/>
+            <a:endParaRPr lang="en-US"/>
+          </a:p>
+        </p:txBody>
+      </p:sp>
+    </p:spTree>
+    <p:extLst>
+      <p:ext uri="{BB962C8B-B14F-4D97-AF65-F5344CB8AC3E}">
+        <p14:creationId xmlns:p14="http://schemas.microsoft.com/office/powerpoint/2010/main" val="1883502782"/>
+      </p:ext>
+    </p:extLst>
+  </p:cSld>
+  <p:clrMapOvr>
+    <a:masterClrMapping/>
+  </p:clrMapOvr>
+</p:sld>
+</file>
+
+<file path=ppt/slides/slide6.xml><?xml version="1.0" encoding="utf-8"?>
+<p:sld xmlns:a="http://schemas.openxmlformats.org/drawingml/2006/main" xmlns:r="http://schemas.openxmlformats.org/officeDocument/2006/relationships" xmlns:p="http://schemas.openxmlformats.org/presentationml/2006/main">
+  <p:cSld>
+    <p:spTree>
+      <p:nvGrpSpPr>
+        <p:cNvPr id="1" name=""/>
+        <p:cNvGrpSpPr/>
+        <p:nvPr/>
+      </p:nvGrpSpPr>
+      <p:grpSpPr>
+        <a:xfrm>
+          <a:off x="0" y="0"/>
+          <a:ext cx="0" cy="0"/>
+          <a:chOff x="0" y="0"/>
+          <a:chExt cx="0" cy="0"/>
+        </a:xfrm>
+      </p:grpSpPr>
+      <p:sp>
+        <p:nvSpPr>
+          <p:cNvPr id="2" name="Title 1"/>
+          <p:cNvSpPr>
+            <a:spLocks noGrp="1"/>
+          </p:cNvSpPr>
+          <p:nvPr>
+            <p:ph type="title"/>
+          </p:nvPr>
+        </p:nvSpPr>
+        <p:spPr>
+          <a:xfrm>
+            <a:off x="1104843" y="618517"/>
+            <a:ext cx="10364451" cy="1596177"/>
+          </a:xfrm>
+        </p:spPr>
+        <p:txBody>
+          <a:bodyPr/>
+          <a:lstStyle/>
+          <a:p>
+            <a:r>
+              <a:rPr lang="en-US" dirty="0" smtClean="0"/>
+              <a:t>Facets</a:t>
+            </a:r>
+            <a:endParaRPr lang="en-US" dirty="0"/>
+          </a:p>
+        </p:txBody>
+      </p:sp>
+      <p:pic>
+        <p:nvPicPr>
+          <p:cNvPr id="4" name="Content Placeholder 3"/>
+          <p:cNvPicPr>
+            <a:picLocks noGrp="1" noChangeAspect="1"/>
+          </p:cNvPicPr>
+          <p:nvPr>
+            <p:ph sz="quarter" idx="13"/>
+          </p:nvPr>
+        </p:nvPicPr>
+        <p:blipFill>
+          <a:blip r:embed="rId2"/>
+          <a:stretch>
+            <a:fillRect/>
+          </a:stretch>
+        </p:blipFill>
+        <p:spPr>
+          <a:xfrm>
+            <a:off x="1572178" y="2214694"/>
+            <a:ext cx="9732334" cy="4035981"/>
+          </a:xfrm>
+          <a:prstGeom prst="rect">
+            <a:avLst/>
+          </a:prstGeom>
+        </p:spPr>
+      </p:pic>
+    </p:spTree>
+    <p:extLst>
+      <p:ext uri="{BB962C8B-B14F-4D97-AF65-F5344CB8AC3E}">
+        <p14:creationId xmlns:p14="http://schemas.microsoft.com/office/powerpoint/2010/main" val="2371544478"/>
+      </p:ext>
+    </p:extLst>
+  </p:cSld>
+  <p:clrMapOvr>
+    <a:masterClrMapping/>
+  </p:clrMapOvr>
+</p:sld>
+</file>
+
+<file path=ppt/slides/slide7.xml><?xml version="1.0" encoding="utf-8"?>
 <p:sld xmlns:a="http://schemas.openxmlformats.org/drawingml/2006/main" xmlns:r="http://schemas.openxmlformats.org/officeDocument/2006/relationships" xmlns:p="http://schemas.openxmlformats.org/presentationml/2006/main">
   <p:cSld>
     <p:spTree>
@@ -7722,7 +8750,7 @@
 </p:sld>
 </file>
 
-<file path=ppt/slides/slide6.xml><?xml version="1.0" encoding="utf-8"?>
+<file path=ppt/slides/slide8.xml><?xml version="1.0" encoding="utf-8"?>
 <p:sld xmlns:a="http://schemas.openxmlformats.org/drawingml/2006/main" xmlns:r="http://schemas.openxmlformats.org/officeDocument/2006/relationships" xmlns:p="http://schemas.openxmlformats.org/presentationml/2006/main">
   <p:cSld>
     <p:spTree>
@@ -7830,7 +8858,7 @@
 </p:sld>
 </file>
 
-<file path=ppt/slides/slide7.xml><?xml version="1.0" encoding="utf-8"?>
+<file path=ppt/slides/slide9.xml><?xml version="1.0" encoding="utf-8"?>
 <p:sld xmlns:a="http://schemas.openxmlformats.org/drawingml/2006/main" xmlns:r="http://schemas.openxmlformats.org/officeDocument/2006/relationships" xmlns:p="http://schemas.openxmlformats.org/presentationml/2006/main">
   <p:cSld>
     <p:spTree>

</xml_diff>